<commit_message>
Changes to last powerpoint
</commit_message>
<xml_diff>
--- a/spacksites/dev-notes/Gen Guide - 27 March 2023.pptx
+++ b/spacksites/dev-notes/Gen Guide - 27 March 2023.pptx
@@ -11,10 +11,10 @@
     <p:handoutMasterId r:id="rId13"/>
   </p:handoutMasterIdLst>
   <p:sldIdLst>
-    <p:sldId id="315" r:id="rId5"/>
-    <p:sldId id="316" r:id="rId6"/>
-    <p:sldId id="317" r:id="rId7"/>
-    <p:sldId id="319" r:id="rId8"/>
+    <p:sldId id="319" r:id="rId5"/>
+    <p:sldId id="315" r:id="rId6"/>
+    <p:sldId id="316" r:id="rId7"/>
+    <p:sldId id="317" r:id="rId8"/>
     <p:sldId id="320" r:id="rId9"/>
     <p:sldId id="321" r:id="rId10"/>
     <p:sldId id="318" r:id="rId11"/>
@@ -11509,7 +11509,7 @@
           <p:cNvPr id="2" name="Title 1">
             <a:extLst>
               <a:ext uri="{FF2B5EF4-FFF2-40B4-BE49-F238E27FC236}">
-                <a16:creationId xmlns:a16="http://schemas.microsoft.com/office/drawing/2014/main" id="{6BC06ECB-D7B5-345B-60BB-EFF8A475F608}"/>
+                <a16:creationId xmlns:a16="http://schemas.microsoft.com/office/drawing/2014/main" id="{255983E5-BD18-214A-337A-90E64039E24E}"/>
               </a:ext>
             </a:extLst>
           </p:cNvPr>
@@ -11522,22 +11522,24 @@
         </p:nvSpPr>
         <p:spPr/>
         <p:txBody>
-          <a:bodyPr/>
+          <a:bodyPr>
+            <a:normAutofit/>
+          </a:bodyPr>
           <a:lstStyle/>
           <a:p>
             <a:r>
-              <a:rPr lang="en-GB" dirty="0"/>
-              <a:t>Code</a:t>
+              <a:rPr lang="en-GB" sz="5400" dirty="0"/>
+              <a:t>Directory layout</a:t>
             </a:r>
           </a:p>
         </p:txBody>
       </p:sp>
       <p:sp>
         <p:nvSpPr>
-          <p:cNvPr id="3" name="Content Placeholder 2">
-            <a:extLst>
-              <a:ext uri="{FF2B5EF4-FFF2-40B4-BE49-F238E27FC236}">
-                <a16:creationId xmlns:a16="http://schemas.microsoft.com/office/drawing/2014/main" id="{53F667CD-54E2-6B18-9400-9A6FEDC19859}"/>
+          <p:cNvPr id="5" name="Text Placeholder 4">
+            <a:extLst>
+              <a:ext uri="{FF2B5EF4-FFF2-40B4-BE49-F238E27FC236}">
+                <a16:creationId xmlns:a16="http://schemas.microsoft.com/office/drawing/2014/main" id="{C90E4E41-23B3-7BC3-39CA-850993295486}"/>
               </a:ext>
             </a:extLst>
           </p:cNvPr>
@@ -11545,7 +11547,7 @@
             <a:spLocks noGrp="1"/>
           </p:cNvSpPr>
           <p:nvPr>
-            <p:ph idx="1"/>
+            <p:ph type="body" idx="1"/>
           </p:nvPr>
         </p:nvSpPr>
         <p:spPr/>
@@ -11554,85 +11556,18 @@
           <a:lstStyle/>
           <a:p>
             <a:r>
-              <a:rPr lang="en-GB" dirty="0" err="1">
-                <a:hlinkClick r:id="rId2"/>
-              </a:rPr>
-              <a:t>git@github.com:UCL-ARC</a:t>
-            </a:r>
-            <a:r>
-              <a:rPr lang="en-GB" dirty="0">
-                <a:hlinkClick r:id="rId2"/>
-              </a:rPr>
-              <a:t>/</a:t>
-            </a:r>
-            <a:r>
-              <a:rPr lang="en-GB" dirty="0" err="1">
-                <a:hlinkClick r:id="rId2"/>
-              </a:rPr>
-              <a:t>hpc-spack.git</a:t>
-            </a:r>
-            <a:endParaRPr lang="en-GB" dirty="0"/>
-          </a:p>
-          <a:p>
-            <a:r>
               <a:rPr lang="en-GB" dirty="0"/>
-              <a:t>class for spack site – src/spacksite.py</a:t>
-            </a:r>
-          </a:p>
-          <a:p>
-            <a:r>
-              <a:rPr lang="en-GB" dirty="0"/>
-              <a:t>config:</a:t>
-            </a:r>
-          </a:p>
-          <a:p>
-            <a:pPr lvl="1"/>
-            <a:r>
-              <a:rPr lang="en-GB" dirty="0"/>
-              <a:t>settings/spack_sites.ini</a:t>
-            </a:r>
-          </a:p>
-          <a:p>
-            <a:pPr lvl="1"/>
-            <a:r>
-              <a:rPr lang="en-GB" dirty="0"/>
-              <a:t>src/appconfig.py</a:t>
-            </a:r>
-          </a:p>
-          <a:p>
-            <a:r>
-              <a:rPr lang="en-GB" dirty="0"/>
-              <a:t>CLI – app.py</a:t>
-            </a:r>
-          </a:p>
-          <a:p>
-            <a:r>
-              <a:rPr lang="en-GB" dirty="0"/>
-              <a:t>Bash scripts for shell env in process-env-scripts/</a:t>
-            </a:r>
-          </a:p>
-          <a:p>
-            <a:r>
-              <a:rPr lang="en-GB" dirty="0"/>
-              <a:t>Spack package scripts are at </a:t>
-            </a:r>
-            <a:r>
-              <a:rPr lang="en-GB" dirty="0" err="1"/>
-              <a:t>hpc</a:t>
-            </a:r>
-            <a:r>
-              <a:rPr lang="en-GB" dirty="0"/>
-              <a:t>-spack/repos</a:t>
+              <a:t>Tree</a:t>
             </a:r>
           </a:p>
         </p:txBody>
       </p:sp>
       <p:sp>
         <p:nvSpPr>
-          <p:cNvPr id="4" name="Slide Number Placeholder 3">
-            <a:extLst>
-              <a:ext uri="{FF2B5EF4-FFF2-40B4-BE49-F238E27FC236}">
-                <a16:creationId xmlns:a16="http://schemas.microsoft.com/office/drawing/2014/main" id="{BFCB9ED3-DE86-1FC4-9310-45AA61BDDF43}"/>
+          <p:cNvPr id="3" name="Content Placeholder 2">
+            <a:extLst>
+              <a:ext uri="{FF2B5EF4-FFF2-40B4-BE49-F238E27FC236}">
+                <a16:creationId xmlns:a16="http://schemas.microsoft.com/office/drawing/2014/main" id="{F7B6845C-762C-9B49-0C8B-BD22560814B5}"/>
               </a:ext>
             </a:extLst>
           </p:cNvPr>
@@ -11640,7 +11575,651 @@
             <a:spLocks noGrp="1"/>
           </p:cNvSpPr>
           <p:nvPr>
-            <p:ph type="sldNum" sz="quarter" idx="12"/>
+            <p:ph sz="half" idx="2"/>
+          </p:nvPr>
+        </p:nvSpPr>
+        <p:spPr>
+          <a:xfrm>
+            <a:off x="1444752" y="2505075"/>
+            <a:ext cx="3765603" cy="3684588"/>
+          </a:xfrm>
+        </p:spPr>
+        <p:txBody>
+          <a:bodyPr numCol="2">
+            <a:noAutofit/>
+          </a:bodyPr>
+          <a:lstStyle/>
+          <a:p>
+            <a:pPr marL="0" indent="0">
+              <a:lnSpc>
+                <a:spcPct val="120000"/>
+              </a:lnSpc>
+              <a:spcBef>
+                <a:spcPts val="0"/>
+              </a:spcBef>
+              <a:buNone/>
+            </a:pPr>
+            <a:r>
+              <a:rPr lang="en-GB" sz="1050" dirty="0"/>
+              <a:t>[ccspapp@login13 spack-test]$ tree -L 2</a:t>
+            </a:r>
+          </a:p>
+          <a:p>
+            <a:pPr marL="0" indent="0">
+              <a:lnSpc>
+                <a:spcPct val="120000"/>
+              </a:lnSpc>
+              <a:spcBef>
+                <a:spcPts val="0"/>
+              </a:spcBef>
+              <a:buNone/>
+            </a:pPr>
+            <a:r>
+              <a:rPr lang="en-GB" sz="1050" dirty="0"/>
+              <a:t>.</a:t>
+            </a:r>
+          </a:p>
+          <a:p>
+            <a:pPr marL="0" indent="0">
+              <a:lnSpc>
+                <a:spcPct val="120000"/>
+              </a:lnSpc>
+              <a:spcBef>
+                <a:spcPts val="0"/>
+              </a:spcBef>
+              <a:buNone/>
+            </a:pPr>
+            <a:r>
+              <a:rPr lang="en-GB" sz="1050" dirty="0"/>
+              <a:t>├── </a:t>
+            </a:r>
+            <a:r>
+              <a:rPr lang="en-GB" sz="1050" dirty="0" err="1"/>
+              <a:t>buildcache</a:t>
+            </a:r>
+            <a:endParaRPr lang="en-GB" sz="1050" dirty="0"/>
+          </a:p>
+          <a:p>
+            <a:pPr marL="0" indent="0">
+              <a:lnSpc>
+                <a:spcPct val="120000"/>
+              </a:lnSpc>
+              <a:spcBef>
+                <a:spcPts val="0"/>
+              </a:spcBef>
+              <a:buNone/>
+            </a:pPr>
+            <a:r>
+              <a:rPr lang="en-GB" sz="1050" dirty="0"/>
+              <a:t>│   └── </a:t>
+            </a:r>
+            <a:r>
+              <a:rPr lang="en-GB" sz="1050" dirty="0" err="1"/>
+              <a:t>build_cache</a:t>
+            </a:r>
+            <a:endParaRPr lang="en-GB" sz="1050" dirty="0"/>
+          </a:p>
+          <a:p>
+            <a:pPr marL="0" indent="0">
+              <a:lnSpc>
+                <a:spcPct val="120000"/>
+              </a:lnSpc>
+              <a:spcBef>
+                <a:spcPts val="0"/>
+              </a:spcBef>
+              <a:buNone/>
+            </a:pPr>
+            <a:r>
+              <a:rPr lang="en-GB" sz="1050" dirty="0"/>
+              <a:t>├── demo-site1</a:t>
+            </a:r>
+          </a:p>
+          <a:p>
+            <a:pPr marL="0" indent="0">
+              <a:lnSpc>
+                <a:spcPct val="120000"/>
+              </a:lnSpc>
+              <a:spcBef>
+                <a:spcPts val="0"/>
+              </a:spcBef>
+              <a:buNone/>
+            </a:pPr>
+            <a:r>
+              <a:rPr lang="en-GB" sz="1050" dirty="0"/>
+              <a:t>│   ├── </a:t>
+            </a:r>
+            <a:r>
+              <a:rPr lang="en-GB" sz="1050" dirty="0" err="1"/>
+              <a:t>build_stage</a:t>
+            </a:r>
+            <a:endParaRPr lang="en-GB" sz="1050" dirty="0"/>
+          </a:p>
+          <a:p>
+            <a:pPr marL="0" indent="0">
+              <a:lnSpc>
+                <a:spcPct val="120000"/>
+              </a:lnSpc>
+              <a:spcBef>
+                <a:spcPts val="0"/>
+              </a:spcBef>
+              <a:buNone/>
+            </a:pPr>
+            <a:r>
+              <a:rPr lang="en-GB" sz="1050" dirty="0"/>
+              <a:t>│   ├── modules</a:t>
+            </a:r>
+          </a:p>
+          <a:p>
+            <a:pPr marL="0" indent="0">
+              <a:lnSpc>
+                <a:spcPct val="120000"/>
+              </a:lnSpc>
+              <a:spcBef>
+                <a:spcPts val="0"/>
+              </a:spcBef>
+              <a:buNone/>
+            </a:pPr>
+            <a:r>
+              <a:rPr lang="en-GB" sz="1050" dirty="0"/>
+              <a:t>│   ├── provenance</a:t>
+            </a:r>
+          </a:p>
+          <a:p>
+            <a:pPr marL="0" indent="0">
+              <a:lnSpc>
+                <a:spcPct val="120000"/>
+              </a:lnSpc>
+              <a:spcBef>
+                <a:spcPts val="0"/>
+              </a:spcBef>
+              <a:buNone/>
+            </a:pPr>
+            <a:r>
+              <a:rPr lang="en-GB" sz="1050" dirty="0"/>
+              <a:t>│   └── spack</a:t>
+            </a:r>
+          </a:p>
+          <a:p>
+            <a:pPr marL="0" indent="0">
+              <a:lnSpc>
+                <a:spcPct val="120000"/>
+              </a:lnSpc>
+              <a:spcBef>
+                <a:spcPts val="0"/>
+              </a:spcBef>
+              <a:buNone/>
+            </a:pPr>
+            <a:r>
+              <a:rPr lang="en-GB" sz="1050" dirty="0"/>
+              <a:t>├── gcc12</a:t>
+            </a:r>
+          </a:p>
+          <a:p>
+            <a:pPr marL="0" indent="0">
+              <a:lnSpc>
+                <a:spcPct val="120000"/>
+              </a:lnSpc>
+              <a:spcBef>
+                <a:spcPts val="0"/>
+              </a:spcBef>
+              <a:buNone/>
+            </a:pPr>
+            <a:r>
+              <a:rPr lang="en-GB" sz="1050" dirty="0"/>
+              <a:t>│   ├── </a:t>
+            </a:r>
+            <a:r>
+              <a:rPr lang="en-GB" sz="1050" dirty="0" err="1"/>
+              <a:t>build_stage</a:t>
+            </a:r>
+            <a:endParaRPr lang="en-GB" sz="1050" dirty="0"/>
+          </a:p>
+          <a:p>
+            <a:pPr marL="0" indent="0">
+              <a:lnSpc>
+                <a:spcPct val="120000"/>
+              </a:lnSpc>
+              <a:spcBef>
+                <a:spcPts val="0"/>
+              </a:spcBef>
+              <a:buNone/>
+            </a:pPr>
+            <a:r>
+              <a:rPr lang="en-GB" sz="1050" dirty="0"/>
+              <a:t>│   ├── modules</a:t>
+            </a:r>
+          </a:p>
+          <a:p>
+            <a:pPr marL="0" indent="0">
+              <a:lnSpc>
+                <a:spcPct val="120000"/>
+              </a:lnSpc>
+              <a:spcBef>
+                <a:spcPts val="0"/>
+              </a:spcBef>
+              <a:buNone/>
+            </a:pPr>
+            <a:r>
+              <a:rPr lang="en-GB" sz="1050" dirty="0"/>
+              <a:t>│   ├── provenance</a:t>
+            </a:r>
+          </a:p>
+          <a:p>
+            <a:pPr marL="0" indent="0">
+              <a:lnSpc>
+                <a:spcPct val="120000"/>
+              </a:lnSpc>
+              <a:spcBef>
+                <a:spcPts val="0"/>
+              </a:spcBef>
+              <a:buNone/>
+            </a:pPr>
+            <a:r>
+              <a:rPr lang="en-GB" sz="1050" dirty="0"/>
+              <a:t>│   └── spack</a:t>
+            </a:r>
+          </a:p>
+          <a:p>
+            <a:pPr marL="0" indent="0">
+              <a:lnSpc>
+                <a:spcPct val="120000"/>
+              </a:lnSpc>
+              <a:spcBef>
+                <a:spcPts val="0"/>
+              </a:spcBef>
+              <a:buNone/>
+            </a:pPr>
+            <a:r>
+              <a:rPr lang="en-GB" sz="1050" dirty="0"/>
+              <a:t>├── site1</a:t>
+            </a:r>
+          </a:p>
+          <a:p>
+            <a:pPr marL="0" indent="0">
+              <a:lnSpc>
+                <a:spcPct val="120000"/>
+              </a:lnSpc>
+              <a:spcBef>
+                <a:spcPts val="0"/>
+              </a:spcBef>
+              <a:buNone/>
+            </a:pPr>
+            <a:r>
+              <a:rPr lang="en-GB" sz="1050" dirty="0"/>
+              <a:t>│   ├── </a:t>
+            </a:r>
+            <a:r>
+              <a:rPr lang="en-GB" sz="1050" dirty="0" err="1"/>
+              <a:t>build_stage</a:t>
+            </a:r>
+            <a:endParaRPr lang="en-GB" sz="1050" dirty="0"/>
+          </a:p>
+          <a:p>
+            <a:pPr marL="0" indent="0">
+              <a:lnSpc>
+                <a:spcPct val="120000"/>
+              </a:lnSpc>
+              <a:spcBef>
+                <a:spcPts val="0"/>
+              </a:spcBef>
+              <a:buNone/>
+            </a:pPr>
+            <a:r>
+              <a:rPr lang="en-GB" sz="1050" dirty="0"/>
+              <a:t>│   ├── modules</a:t>
+            </a:r>
+          </a:p>
+          <a:p>
+            <a:pPr marL="0" indent="0">
+              <a:lnSpc>
+                <a:spcPct val="120000"/>
+              </a:lnSpc>
+              <a:spcBef>
+                <a:spcPts val="0"/>
+              </a:spcBef>
+              <a:buNone/>
+            </a:pPr>
+            <a:r>
+              <a:rPr lang="en-GB" sz="1050" dirty="0"/>
+              <a:t>│   ├── provenance</a:t>
+            </a:r>
+          </a:p>
+          <a:p>
+            <a:pPr marL="0" indent="0">
+              <a:lnSpc>
+                <a:spcPct val="120000"/>
+              </a:lnSpc>
+              <a:spcBef>
+                <a:spcPts val="0"/>
+              </a:spcBef>
+              <a:buNone/>
+            </a:pPr>
+            <a:r>
+              <a:rPr lang="en-GB" sz="1050" dirty="0"/>
+              <a:t>│   └── spack</a:t>
+            </a:r>
+          </a:p>
+          <a:p>
+            <a:pPr marL="0" indent="0">
+              <a:lnSpc>
+                <a:spcPct val="120000"/>
+              </a:lnSpc>
+              <a:spcBef>
+                <a:spcPts val="0"/>
+              </a:spcBef>
+              <a:buNone/>
+            </a:pPr>
+            <a:r>
+              <a:rPr lang="en-GB" sz="1050" dirty="0"/>
+              <a:t>├── site2</a:t>
+            </a:r>
+          </a:p>
+          <a:p>
+            <a:pPr marL="0" indent="0">
+              <a:lnSpc>
+                <a:spcPct val="120000"/>
+              </a:lnSpc>
+              <a:spcBef>
+                <a:spcPts val="0"/>
+              </a:spcBef>
+              <a:buNone/>
+            </a:pPr>
+            <a:r>
+              <a:rPr lang="en-GB" sz="1050" dirty="0"/>
+              <a:t>│   ├── </a:t>
+            </a:r>
+            <a:r>
+              <a:rPr lang="en-GB" sz="1050" dirty="0" err="1"/>
+              <a:t>build_stage</a:t>
+            </a:r>
+            <a:endParaRPr lang="en-GB" sz="1050" dirty="0"/>
+          </a:p>
+          <a:p>
+            <a:pPr marL="0" indent="0">
+              <a:lnSpc>
+                <a:spcPct val="120000"/>
+              </a:lnSpc>
+              <a:spcBef>
+                <a:spcPts val="0"/>
+              </a:spcBef>
+              <a:buNone/>
+            </a:pPr>
+            <a:r>
+              <a:rPr lang="en-GB" sz="1050" dirty="0"/>
+              <a:t>│   ├── modules</a:t>
+            </a:r>
+          </a:p>
+          <a:p>
+            <a:pPr marL="0" indent="0">
+              <a:lnSpc>
+                <a:spcPct val="120000"/>
+              </a:lnSpc>
+              <a:spcBef>
+                <a:spcPts val="0"/>
+              </a:spcBef>
+              <a:buNone/>
+            </a:pPr>
+            <a:r>
+              <a:rPr lang="en-GB" sz="1050" dirty="0"/>
+              <a:t>│   ├── provenance</a:t>
+            </a:r>
+          </a:p>
+          <a:p>
+            <a:pPr marL="0" indent="0">
+              <a:lnSpc>
+                <a:spcPct val="120000"/>
+              </a:lnSpc>
+              <a:spcBef>
+                <a:spcPts val="0"/>
+              </a:spcBef>
+              <a:buNone/>
+            </a:pPr>
+            <a:r>
+              <a:rPr lang="en-GB" sz="1050" dirty="0"/>
+              <a:t>│   └── spack</a:t>
+            </a:r>
+          </a:p>
+          <a:p>
+            <a:pPr marL="0" indent="0">
+              <a:lnSpc>
+                <a:spcPct val="120000"/>
+              </a:lnSpc>
+              <a:spcBef>
+                <a:spcPts val="0"/>
+              </a:spcBef>
+              <a:buNone/>
+            </a:pPr>
+            <a:r>
+              <a:rPr lang="en-GB" sz="1050" dirty="0"/>
+              <a:t>├── site3</a:t>
+            </a:r>
+          </a:p>
+          <a:p>
+            <a:pPr marL="0" indent="0">
+              <a:lnSpc>
+                <a:spcPct val="120000"/>
+              </a:lnSpc>
+              <a:spcBef>
+                <a:spcPts val="0"/>
+              </a:spcBef>
+              <a:buNone/>
+            </a:pPr>
+            <a:r>
+              <a:rPr lang="en-GB" sz="1050" dirty="0"/>
+              <a:t>│   ├── </a:t>
+            </a:r>
+            <a:r>
+              <a:rPr lang="en-GB" sz="1050" dirty="0" err="1"/>
+              <a:t>build_stage</a:t>
+            </a:r>
+            <a:endParaRPr lang="en-GB" sz="1050" dirty="0"/>
+          </a:p>
+          <a:p>
+            <a:pPr marL="0" indent="0">
+              <a:lnSpc>
+                <a:spcPct val="120000"/>
+              </a:lnSpc>
+              <a:spcBef>
+                <a:spcPts val="0"/>
+              </a:spcBef>
+              <a:buNone/>
+            </a:pPr>
+            <a:r>
+              <a:rPr lang="en-GB" sz="1050" dirty="0"/>
+              <a:t>│   ├── modules</a:t>
+            </a:r>
+          </a:p>
+          <a:p>
+            <a:pPr marL="0" indent="0">
+              <a:lnSpc>
+                <a:spcPct val="120000"/>
+              </a:lnSpc>
+              <a:spcBef>
+                <a:spcPts val="0"/>
+              </a:spcBef>
+              <a:buNone/>
+            </a:pPr>
+            <a:r>
+              <a:rPr lang="en-GB" sz="1050" dirty="0"/>
+              <a:t>│   ├── provenance</a:t>
+            </a:r>
+          </a:p>
+          <a:p>
+            <a:pPr marL="0" indent="0">
+              <a:lnSpc>
+                <a:spcPct val="120000"/>
+              </a:lnSpc>
+              <a:spcBef>
+                <a:spcPts val="0"/>
+              </a:spcBef>
+              <a:buNone/>
+            </a:pPr>
+            <a:r>
+              <a:rPr lang="en-GB" sz="1050" dirty="0"/>
+              <a:t>│   └── spack</a:t>
+            </a:r>
+          </a:p>
+          <a:p>
+            <a:pPr marL="0" indent="0">
+              <a:lnSpc>
+                <a:spcPct val="120000"/>
+              </a:lnSpc>
+              <a:spcBef>
+                <a:spcPts val="0"/>
+              </a:spcBef>
+              <a:buNone/>
+            </a:pPr>
+            <a:r>
+              <a:rPr lang="en-GB" sz="1050" dirty="0"/>
+              <a:t>├── site4</a:t>
+            </a:r>
+          </a:p>
+          <a:p>
+            <a:pPr marL="0" indent="0">
+              <a:lnSpc>
+                <a:spcPct val="120000"/>
+              </a:lnSpc>
+              <a:spcBef>
+                <a:spcPts val="0"/>
+              </a:spcBef>
+              <a:buNone/>
+            </a:pPr>
+            <a:r>
+              <a:rPr lang="en-GB" sz="1050" dirty="0"/>
+              <a:t>│   ├── </a:t>
+            </a:r>
+            <a:r>
+              <a:rPr lang="en-GB" sz="1050" dirty="0" err="1"/>
+              <a:t>build_stage</a:t>
+            </a:r>
+            <a:endParaRPr lang="en-GB" sz="1050" dirty="0"/>
+          </a:p>
+          <a:p>
+            <a:pPr marL="0" indent="0">
+              <a:lnSpc>
+                <a:spcPct val="120000"/>
+              </a:lnSpc>
+              <a:spcBef>
+                <a:spcPts val="0"/>
+              </a:spcBef>
+              <a:buNone/>
+            </a:pPr>
+            <a:r>
+              <a:rPr lang="en-GB" sz="1050" dirty="0"/>
+              <a:t>│   ├── provenance</a:t>
+            </a:r>
+          </a:p>
+          <a:p>
+            <a:pPr marL="0" indent="0">
+              <a:lnSpc>
+                <a:spcPct val="120000"/>
+              </a:lnSpc>
+              <a:spcBef>
+                <a:spcPts val="0"/>
+              </a:spcBef>
+              <a:buNone/>
+            </a:pPr>
+            <a:r>
+              <a:rPr lang="en-GB" sz="1050" dirty="0"/>
+              <a:t>│   └── spack</a:t>
+            </a:r>
+          </a:p>
+          <a:p>
+            <a:pPr marL="0" indent="0">
+              <a:lnSpc>
+                <a:spcPct val="120000"/>
+              </a:lnSpc>
+              <a:spcBef>
+                <a:spcPts val="0"/>
+              </a:spcBef>
+              <a:buNone/>
+            </a:pPr>
+            <a:r>
+              <a:rPr lang="en-GB" sz="1050" dirty="0"/>
+              <a:t>└── site5</a:t>
+            </a:r>
+          </a:p>
+          <a:p>
+            <a:pPr marL="0" indent="0">
+              <a:lnSpc>
+                <a:spcPct val="120000"/>
+              </a:lnSpc>
+              <a:spcBef>
+                <a:spcPts val="0"/>
+              </a:spcBef>
+              <a:buNone/>
+            </a:pPr>
+            <a:r>
+              <a:rPr lang="en-GB" sz="1050" dirty="0"/>
+              <a:t>    ├── </a:t>
+            </a:r>
+            <a:r>
+              <a:rPr lang="en-GB" sz="1050" dirty="0" err="1"/>
+              <a:t>build_stage</a:t>
+            </a:r>
+            <a:endParaRPr lang="en-GB" sz="1050" dirty="0"/>
+          </a:p>
+          <a:p>
+            <a:pPr marL="0" indent="0">
+              <a:lnSpc>
+                <a:spcPct val="120000"/>
+              </a:lnSpc>
+              <a:spcBef>
+                <a:spcPts val="0"/>
+              </a:spcBef>
+              <a:buNone/>
+            </a:pPr>
+            <a:r>
+              <a:rPr lang="en-GB" sz="1050" dirty="0"/>
+              <a:t>    ├── modules</a:t>
+            </a:r>
+          </a:p>
+          <a:p>
+            <a:pPr marL="0" indent="0">
+              <a:lnSpc>
+                <a:spcPct val="120000"/>
+              </a:lnSpc>
+              <a:spcBef>
+                <a:spcPts val="0"/>
+              </a:spcBef>
+              <a:buNone/>
+            </a:pPr>
+            <a:r>
+              <a:rPr lang="en-GB" sz="1050" dirty="0"/>
+              <a:t>    ├── provenance</a:t>
+            </a:r>
+          </a:p>
+          <a:p>
+            <a:pPr marL="0" indent="0">
+              <a:lnSpc>
+                <a:spcPct val="120000"/>
+              </a:lnSpc>
+              <a:spcBef>
+                <a:spcPts val="0"/>
+              </a:spcBef>
+              <a:buNone/>
+            </a:pPr>
+            <a:r>
+              <a:rPr lang="en-GB" sz="1050" dirty="0"/>
+              <a:t>    └── spack</a:t>
+            </a:r>
+          </a:p>
+        </p:txBody>
+      </p:sp>
+      <p:sp>
+        <p:nvSpPr>
+          <p:cNvPr id="6" name="Text Placeholder 5">
+            <a:extLst>
+              <a:ext uri="{FF2B5EF4-FFF2-40B4-BE49-F238E27FC236}">
+                <a16:creationId xmlns:a16="http://schemas.microsoft.com/office/drawing/2014/main" id="{9D8A3AF3-07EA-B3F0-6AE6-887AA996E215}"/>
+              </a:ext>
+            </a:extLst>
+          </p:cNvPr>
+          <p:cNvSpPr>
+            <a:spLocks noGrp="1"/>
+          </p:cNvSpPr>
+          <p:nvPr>
+            <p:ph type="body" sz="quarter" idx="3"/>
           </p:nvPr>
         </p:nvSpPr>
         <p:spPr/>
@@ -11648,6 +12227,203 @@
           <a:bodyPr/>
           <a:lstStyle/>
           <a:p>
+            <a:r>
+              <a:rPr lang="en-GB" dirty="0"/>
+              <a:t>Notes</a:t>
+            </a:r>
+          </a:p>
+        </p:txBody>
+      </p:sp>
+      <p:sp>
+        <p:nvSpPr>
+          <p:cNvPr id="7" name="Content Placeholder 6">
+            <a:extLst>
+              <a:ext uri="{FF2B5EF4-FFF2-40B4-BE49-F238E27FC236}">
+                <a16:creationId xmlns:a16="http://schemas.microsoft.com/office/drawing/2014/main" id="{860B00DE-A02F-6FC5-C678-0BFF9DC4FDDD}"/>
+              </a:ext>
+            </a:extLst>
+          </p:cNvPr>
+          <p:cNvSpPr>
+            <a:spLocks noGrp="1"/>
+          </p:cNvSpPr>
+          <p:nvPr>
+            <p:ph sz="quarter" idx="4"/>
+          </p:nvPr>
+        </p:nvSpPr>
+        <p:spPr>
+          <a:xfrm>
+            <a:off x="5210355" y="2505075"/>
+            <a:ext cx="6128205" cy="3684588"/>
+          </a:xfrm>
+        </p:spPr>
+        <p:txBody>
+          <a:bodyPr>
+            <a:normAutofit fontScale="85000" lnSpcReduction="20000"/>
+          </a:bodyPr>
+          <a:lstStyle/>
+          <a:p>
+            <a:r>
+              <a:rPr lang="en-GB" dirty="0"/>
+              <a:t>These are on Myriad at </a:t>
+            </a:r>
+            <a:br>
+              <a:rPr lang="en-GB" dirty="0"/>
+            </a:br>
+            <a:r>
+              <a:rPr lang="en-GB" b="0" i="0" dirty="0">
+                <a:effectLst/>
+                <a:latin typeface="Consolas" panose="020B0609020204030204" pitchFamily="49" charset="0"/>
+              </a:rPr>
+              <a:t>/shared/</a:t>
+            </a:r>
+            <a:r>
+              <a:rPr lang="en-GB" b="0" i="0" dirty="0" err="1">
+                <a:effectLst/>
+                <a:latin typeface="Consolas" panose="020B0609020204030204" pitchFamily="49" charset="0"/>
+              </a:rPr>
+              <a:t>ucl</a:t>
+            </a:r>
+            <a:r>
+              <a:rPr lang="en-GB" b="0" i="0" dirty="0">
+                <a:effectLst/>
+                <a:latin typeface="Consolas" panose="020B0609020204030204" pitchFamily="49" charset="0"/>
+              </a:rPr>
+              <a:t>/apps/spack-test</a:t>
+            </a:r>
+          </a:p>
+          <a:p>
+            <a:r>
+              <a:rPr lang="en-GB" dirty="0"/>
+              <a:t>1</a:t>
+            </a:r>
+            <a:r>
+              <a:rPr lang="en-GB" baseline="30000" dirty="0"/>
+              <a:t>st</a:t>
+            </a:r>
+            <a:r>
+              <a:rPr lang="en-GB" dirty="0"/>
+              <a:t> level are per spack site, but the actual respective spack site is at the 2</a:t>
+            </a:r>
+            <a:r>
+              <a:rPr lang="en-GB" baseline="30000" dirty="0"/>
+              <a:t>nd</a:t>
+            </a:r>
+            <a:r>
+              <a:rPr lang="en-GB" dirty="0"/>
+              <a:t> level below that</a:t>
+            </a:r>
+          </a:p>
+          <a:p>
+            <a:r>
+              <a:rPr lang="en-GB" dirty="0"/>
+              <a:t>Respective build stage – so not to fill </a:t>
+            </a:r>
+            <a:r>
+              <a:rPr lang="en-GB" dirty="0" err="1"/>
+              <a:t>ccspapp</a:t>
+            </a:r>
+            <a:r>
+              <a:rPr lang="en-GB" dirty="0"/>
+              <a:t> space</a:t>
+            </a:r>
+          </a:p>
+          <a:p>
+            <a:r>
+              <a:rPr lang="en-GB" dirty="0"/>
+              <a:t>Respective modules/ modules for a site will go here – </a:t>
+            </a:r>
+            <a:r>
+              <a:rPr lang="en-GB" dirty="0">
+                <a:solidFill>
+                  <a:schemeClr val="accent3"/>
+                </a:solidFill>
+              </a:rPr>
+              <a:t>sub directories per module list section that we have now</a:t>
+            </a:r>
+          </a:p>
+          <a:p>
+            <a:r>
+              <a:rPr lang="en-GB" dirty="0">
+                <a:solidFill>
+                  <a:schemeClr val="accent3"/>
+                </a:solidFill>
+              </a:rPr>
+              <a:t>Respective provenance/ - a record of how site was built (needed?) </a:t>
+            </a:r>
+            <a:r>
+              <a:rPr lang="en-GB" dirty="0" err="1">
+                <a:solidFill>
+                  <a:schemeClr val="accent3"/>
+                </a:solidFill>
+              </a:rPr>
+              <a:t>cf</a:t>
+            </a:r>
+            <a:r>
+              <a:rPr lang="en-GB" dirty="0">
+                <a:solidFill>
+                  <a:schemeClr val="accent3"/>
+                </a:solidFill>
+              </a:rPr>
+              <a:t> archive</a:t>
+            </a:r>
+          </a:p>
+          <a:p>
+            <a:r>
+              <a:rPr lang="en-GB" dirty="0" err="1"/>
+              <a:t>Buildcache</a:t>
+            </a:r>
+            <a:r>
+              <a:rPr lang="en-GB" dirty="0"/>
+              <a:t> – all sites use this to retrieve built packages. Need to push built packages here</a:t>
+            </a:r>
+          </a:p>
+          <a:p>
+            <a:r>
+              <a:rPr lang="en-GB" dirty="0"/>
+              <a:t>gcc12 site – </a:t>
+            </a:r>
+            <a:r>
+              <a:rPr lang="en-GB" dirty="0" err="1"/>
+              <a:t>gcc</a:t>
+            </a:r>
+            <a:r>
+              <a:rPr lang="en-GB" dirty="0"/>
+              <a:t> and deps were built here and pushed to </a:t>
+            </a:r>
+            <a:r>
+              <a:rPr lang="en-GB" dirty="0" err="1"/>
+              <a:t>buildcache</a:t>
+            </a:r>
+            <a:endParaRPr lang="en-GB" dirty="0"/>
+          </a:p>
+        </p:txBody>
+      </p:sp>
+      <p:sp>
+        <p:nvSpPr>
+          <p:cNvPr id="4" name="Slide Number Placeholder 3">
+            <a:extLst>
+              <a:ext uri="{FF2B5EF4-FFF2-40B4-BE49-F238E27FC236}">
+                <a16:creationId xmlns:a16="http://schemas.microsoft.com/office/drawing/2014/main" id="{F299CD00-615E-73E2-0C58-1740C1523663}"/>
+              </a:ext>
+            </a:extLst>
+          </p:cNvPr>
+          <p:cNvSpPr>
+            <a:spLocks noGrp="1"/>
+          </p:cNvSpPr>
+          <p:nvPr>
+            <p:ph type="sldNum" sz="quarter" idx="4294967295"/>
+          </p:nvPr>
+        </p:nvSpPr>
+        <p:spPr>
+          <a:xfrm>
+            <a:off x="9448800" y="6356350"/>
+            <a:ext cx="2743200" cy="365125"/>
+          </a:xfrm>
+        </p:spPr>
+        <p:txBody>
+          <a:bodyPr/>
+          <a:lstStyle/>
+          <a:p>
             <a:pPr rtl="0"/>
             <a:fld id="{D8DA9DAA-006C-4F4B-980E-E3DF019B24E2}" type="slidenum">
               <a:rPr lang="en-GB" noProof="0" smtClean="0"/>
@@ -11660,7 +12436,7 @@
     </p:spTree>
     <p:extLst>
       <p:ext uri="{BB962C8B-B14F-4D97-AF65-F5344CB8AC3E}">
-        <p14:creationId xmlns:p14="http://schemas.microsoft.com/office/powerpoint/2010/main" val="966186262"/>
+        <p14:creationId xmlns:p14="http://schemas.microsoft.com/office/powerpoint/2010/main" val="1508535455"/>
       </p:ext>
     </p:extLst>
   </p:cSld>
@@ -11692,7 +12468,7 @@
           <p:cNvPr id="2" name="Title 1">
             <a:extLst>
               <a:ext uri="{FF2B5EF4-FFF2-40B4-BE49-F238E27FC236}">
-                <a16:creationId xmlns:a16="http://schemas.microsoft.com/office/drawing/2014/main" id="{818E6085-3256-1207-0C3A-325026922DE9}"/>
+                <a16:creationId xmlns:a16="http://schemas.microsoft.com/office/drawing/2014/main" id="{6BC06ECB-D7B5-345B-60BB-EFF8A475F608}"/>
               </a:ext>
             </a:extLst>
           </p:cNvPr>
@@ -11710,7 +12486,7 @@
           <a:p>
             <a:r>
               <a:rPr lang="en-GB" dirty="0"/>
-              <a:t>Spack settings</a:t>
+              <a:t>Code</a:t>
             </a:r>
           </a:p>
         </p:txBody>
@@ -11720,7 +12496,7 @@
           <p:cNvPr id="3" name="Content Placeholder 2">
             <a:extLst>
               <a:ext uri="{FF2B5EF4-FFF2-40B4-BE49-F238E27FC236}">
-                <a16:creationId xmlns:a16="http://schemas.microsoft.com/office/drawing/2014/main" id="{1DE54E25-CE9E-ECE3-1FF1-E2A9FA5BC58C}"/>
+                <a16:creationId xmlns:a16="http://schemas.microsoft.com/office/drawing/2014/main" id="{53F667CD-54E2-6B18-9400-9A6FEDC19859}"/>
               </a:ext>
             </a:extLst>
           </p:cNvPr>
@@ -11733,104 +12509,80 @@
         </p:nvSpPr>
         <p:spPr/>
         <p:txBody>
-          <a:bodyPr>
-            <a:normAutofit/>
-          </a:bodyPr>
+          <a:bodyPr/>
           <a:lstStyle/>
           <a:p>
             <a:r>
-              <a:rPr lang="en-GB" sz="2400" dirty="0"/>
-              <a:t>Initial settings for a site at settings/</a:t>
-            </a:r>
-            <a:r>
-              <a:rPr lang="en-GB" sz="2400" dirty="0" err="1"/>
-              <a:t>initial_site</a:t>
-            </a:r>
-            <a:r>
-              <a:rPr lang="en-GB" sz="2400" dirty="0"/>
-              <a:t>_*.</a:t>
-            </a:r>
-            <a:r>
-              <a:rPr lang="en-GB" sz="2400" dirty="0" err="1"/>
-              <a:t>yaml</a:t>
-            </a:r>
-            <a:endParaRPr lang="en-GB" sz="2400" dirty="0"/>
-          </a:p>
-          <a:p>
-            <a:r>
-              <a:rPr lang="en-GB" sz="2400" dirty="0"/>
-              <a:t>Spack environments for building at spack-env-templates/dev1/build</a:t>
+              <a:rPr lang="en-GB" dirty="0" err="1">
+                <a:hlinkClick r:id="rId2"/>
+              </a:rPr>
+              <a:t>git@github.com:UCL-ARC</a:t>
+            </a:r>
+            <a:r>
+              <a:rPr lang="en-GB" dirty="0">
+                <a:hlinkClick r:id="rId2"/>
+              </a:rPr>
+              <a:t>/</a:t>
+            </a:r>
+            <a:r>
+              <a:rPr lang="en-GB" dirty="0" err="1">
+                <a:hlinkClick r:id="rId2"/>
+              </a:rPr>
+              <a:t>hpc-spack.git</a:t>
+            </a:r>
+            <a:endParaRPr lang="en-GB" dirty="0"/>
+          </a:p>
+          <a:p>
+            <a:r>
+              <a:rPr lang="en-GB" dirty="0"/>
+              <a:t>class for spack site – src/spacksite.py</a:t>
+            </a:r>
+          </a:p>
+          <a:p>
+            <a:r>
+              <a:rPr lang="en-GB" dirty="0"/>
+              <a:t>config:</a:t>
             </a:r>
           </a:p>
           <a:p>
             <a:pPr lvl="1"/>
             <a:r>
-              <a:rPr lang="en-GB" sz="2000" dirty="0"/>
-              <a:t>First compiler: </a:t>
-            </a:r>
-            <a:r>
-              <a:rPr lang="en-US" sz="2000" dirty="0"/>
-              <a:t>spack-env-templates/dev1/</a:t>
-            </a:r>
-            <a:r>
-              <a:rPr lang="en-US" sz="2000" dirty="0" err="1"/>
-              <a:t>first_compiler.yaml</a:t>
-            </a:r>
-            <a:endParaRPr lang="en-GB" sz="2000" dirty="0"/>
-          </a:p>
-          <a:p>
-            <a:r>
-              <a:rPr lang="en-GB" sz="2400" dirty="0">
-                <a:solidFill>
-                  <a:schemeClr val="accent3"/>
-                </a:solidFill>
-              </a:rPr>
-              <a:t>Spack environments for modules at </a:t>
-            </a:r>
-            <a:br>
-              <a:rPr lang="en-GB" sz="2400" dirty="0">
-                <a:solidFill>
-                  <a:schemeClr val="accent3"/>
-                </a:solidFill>
-              </a:rPr>
-            </a:br>
-            <a:r>
-              <a:rPr lang="en-GB" sz="2400" dirty="0">
-                <a:solidFill>
-                  <a:schemeClr val="accent3"/>
-                </a:solidFill>
-              </a:rPr>
-              <a:t>spack-env-templates/dev1/modules</a:t>
-            </a:r>
-          </a:p>
-          <a:p>
-            <a:r>
-              <a:rPr lang="en-GB" sz="2400" dirty="0">
-                <a:solidFill>
-                  <a:schemeClr val="accent3"/>
-                </a:solidFill>
-              </a:rPr>
-              <a:t>Documentary archive at </a:t>
-            </a:r>
-            <a:r>
-              <a:rPr lang="en-GB" sz="2400" dirty="0" err="1">
-                <a:solidFill>
-                  <a:schemeClr val="accent3"/>
-                </a:solidFill>
-              </a:rPr>
-              <a:t>spacksites</a:t>
-            </a:r>
-            <a:r>
-              <a:rPr lang="en-GB" sz="2400" dirty="0">
-                <a:solidFill>
-                  <a:schemeClr val="accent3"/>
-                </a:solidFill>
-              </a:rPr>
-              <a:t>/spack-env-archive</a:t>
-            </a:r>
-          </a:p>
-          <a:p>
-            <a:endParaRPr lang="en-GB" sz="2400" dirty="0"/>
+              <a:rPr lang="en-GB" dirty="0"/>
+              <a:t>settings/spack_sites.ini</a:t>
+            </a:r>
+          </a:p>
+          <a:p>
+            <a:pPr lvl="1"/>
+            <a:r>
+              <a:rPr lang="en-GB" dirty="0"/>
+              <a:t>src/appconfig.py</a:t>
+            </a:r>
+          </a:p>
+          <a:p>
+            <a:r>
+              <a:rPr lang="en-GB" dirty="0"/>
+              <a:t>CLI – app.py</a:t>
+            </a:r>
+          </a:p>
+          <a:p>
+            <a:r>
+              <a:rPr lang="en-GB" dirty="0"/>
+              <a:t>Bash scripts for shell env in process-env-scripts/</a:t>
+            </a:r>
+          </a:p>
+          <a:p>
+            <a:r>
+              <a:rPr lang="en-GB" dirty="0"/>
+              <a:t>Spack package scripts are at </a:t>
+            </a:r>
+            <a:r>
+              <a:rPr lang="en-GB" dirty="0" err="1"/>
+              <a:t>hpc</a:t>
+            </a:r>
+            <a:r>
+              <a:rPr lang="en-GB" dirty="0"/>
+              <a:t>-spack/repos</a:t>
+            </a:r>
           </a:p>
         </p:txBody>
       </p:sp>
@@ -11839,7 +12591,7 @@
           <p:cNvPr id="4" name="Slide Number Placeholder 3">
             <a:extLst>
               <a:ext uri="{FF2B5EF4-FFF2-40B4-BE49-F238E27FC236}">
-                <a16:creationId xmlns:a16="http://schemas.microsoft.com/office/drawing/2014/main" id="{ECA19F4D-DC95-8F39-D55D-74F773B492EA}"/>
+                <a16:creationId xmlns:a16="http://schemas.microsoft.com/office/drawing/2014/main" id="{BFCB9ED3-DE86-1FC4-9310-45AA61BDDF43}"/>
               </a:ext>
             </a:extLst>
           </p:cNvPr>
@@ -11864,49 +12616,10 @@
           </a:p>
         </p:txBody>
       </p:sp>
-      <p:sp>
-        <p:nvSpPr>
-          <p:cNvPr id="5" name="TextBox 4">
-            <a:extLst>
-              <a:ext uri="{FF2B5EF4-FFF2-40B4-BE49-F238E27FC236}">
-                <a16:creationId xmlns:a16="http://schemas.microsoft.com/office/drawing/2014/main" id="{FF5E309C-A148-B072-A1FA-B3B01E6427E4}"/>
-              </a:ext>
-            </a:extLst>
-          </p:cNvPr>
-          <p:cNvSpPr txBox="1"/>
-          <p:nvPr/>
-        </p:nvSpPr>
-        <p:spPr>
-          <a:xfrm>
-            <a:off x="2346384" y="5572664"/>
-            <a:ext cx="6047117" cy="369332"/>
-          </a:xfrm>
-          <a:prstGeom prst="rect">
-            <a:avLst/>
-          </a:prstGeom>
-          <a:noFill/>
-        </p:spPr>
-        <p:txBody>
-          <a:bodyPr wrap="square" rtlCol="0">
-            <a:spAutoFit/>
-          </a:bodyPr>
-          <a:lstStyle/>
-          <a:p>
-            <a:r>
-              <a:rPr lang="en-GB" dirty="0">
-                <a:solidFill>
-                  <a:schemeClr val="accent3"/>
-                </a:solidFill>
-              </a:rPr>
-              <a:t>This colour = not yet implemented</a:t>
-            </a:r>
-          </a:p>
-        </p:txBody>
-      </p:sp>
     </p:spTree>
     <p:extLst>
       <p:ext uri="{BB962C8B-B14F-4D97-AF65-F5344CB8AC3E}">
-        <p14:creationId xmlns:p14="http://schemas.microsoft.com/office/powerpoint/2010/main" val="826630174"/>
+        <p14:creationId xmlns:p14="http://schemas.microsoft.com/office/powerpoint/2010/main" val="966186262"/>
       </p:ext>
     </p:extLst>
   </p:cSld>
@@ -11938,7 +12651,7 @@
           <p:cNvPr id="2" name="Title 1">
             <a:extLst>
               <a:ext uri="{FF2B5EF4-FFF2-40B4-BE49-F238E27FC236}">
-                <a16:creationId xmlns:a16="http://schemas.microsoft.com/office/drawing/2014/main" id="{7D3D9DD2-C208-5563-4169-88EDA00C3D5E}"/>
+                <a16:creationId xmlns:a16="http://schemas.microsoft.com/office/drawing/2014/main" id="{818E6085-3256-1207-0C3A-325026922DE9}"/>
               </a:ext>
             </a:extLst>
           </p:cNvPr>
@@ -11956,7 +12669,7 @@
           <a:p>
             <a:r>
               <a:rPr lang="en-GB" dirty="0"/>
-              <a:t>Documents</a:t>
+              <a:t>Spack settings</a:t>
             </a:r>
           </a:p>
         </p:txBody>
@@ -11966,7 +12679,7 @@
           <p:cNvPr id="3" name="Content Placeholder 2">
             <a:extLst>
               <a:ext uri="{FF2B5EF4-FFF2-40B4-BE49-F238E27FC236}">
-                <a16:creationId xmlns:a16="http://schemas.microsoft.com/office/drawing/2014/main" id="{2E1DA8A9-92E2-F1B2-53E6-BA5B2E14B462}"/>
+                <a16:creationId xmlns:a16="http://schemas.microsoft.com/office/drawing/2014/main" id="{1DE54E25-CE9E-ECE3-1FF1-E2A9FA5BC58C}"/>
               </a:ext>
             </a:extLst>
           </p:cNvPr>
@@ -11979,32 +12692,104 @@
         </p:nvSpPr>
         <p:spPr/>
         <p:txBody>
-          <a:bodyPr/>
+          <a:bodyPr>
+            <a:normAutofit/>
+          </a:bodyPr>
           <a:lstStyle/>
           <a:p>
             <a:r>
-              <a:rPr lang="en-US" dirty="0"/>
-              <a:t>spacksites/Developing_on_Myriad.md – how to work on the existing site set on Myriad as </a:t>
-            </a:r>
-            <a:r>
-              <a:rPr lang="en-US" dirty="0" err="1"/>
-              <a:t>ccspapp</a:t>
-            </a:r>
-            <a:endParaRPr lang="en-US" dirty="0"/>
-          </a:p>
-          <a:p>
-            <a:r>
-              <a:rPr lang="en-US" dirty="0" err="1"/>
+              <a:rPr lang="en-GB" sz="2400" dirty="0"/>
+              <a:t>Initial settings for a site at settings/</a:t>
+            </a:r>
+            <a:r>
+              <a:rPr lang="en-GB" sz="2400" dirty="0" err="1"/>
+              <a:t>initial_site</a:t>
+            </a:r>
+            <a:r>
+              <a:rPr lang="en-GB" sz="2400" dirty="0"/>
+              <a:t>_*.</a:t>
+            </a:r>
+            <a:r>
+              <a:rPr lang="en-GB" sz="2400" dirty="0" err="1"/>
+              <a:t>yaml</a:t>
+            </a:r>
+            <a:endParaRPr lang="en-GB" sz="2400" dirty="0"/>
+          </a:p>
+          <a:p>
+            <a:r>
+              <a:rPr lang="en-GB" sz="2400" dirty="0"/>
+              <a:t>Spack environments for building at spack-env-templates/dev1/build</a:t>
+            </a:r>
+          </a:p>
+          <a:p>
+            <a:pPr lvl="1"/>
+            <a:r>
+              <a:rPr lang="en-GB" sz="2000" dirty="0"/>
+              <a:t>First compiler: </a:t>
+            </a:r>
+            <a:r>
+              <a:rPr lang="en-US" sz="2000" dirty="0"/>
+              <a:t>spack-env-templates/dev1/</a:t>
+            </a:r>
+            <a:r>
+              <a:rPr lang="en-US" sz="2000" dirty="0" err="1"/>
+              <a:t>first_compiler.yaml</a:t>
+            </a:r>
+            <a:endParaRPr lang="en-GB" sz="2000" dirty="0"/>
+          </a:p>
+          <a:p>
+            <a:r>
+              <a:rPr lang="en-GB" sz="2400" dirty="0">
+                <a:solidFill>
+                  <a:schemeClr val="accent3"/>
+                </a:solidFill>
+              </a:rPr>
+              <a:t>Spack environments for modules at </a:t>
+            </a:r>
+            <a:br>
+              <a:rPr lang="en-GB" sz="2400" dirty="0">
+                <a:solidFill>
+                  <a:schemeClr val="accent3"/>
+                </a:solidFill>
+              </a:rPr>
+            </a:br>
+            <a:r>
+              <a:rPr lang="en-GB" sz="2400" dirty="0">
+                <a:solidFill>
+                  <a:schemeClr val="accent3"/>
+                </a:solidFill>
+              </a:rPr>
+              <a:t>spack-env-templates/dev1/modules</a:t>
+            </a:r>
+          </a:p>
+          <a:p>
+            <a:r>
+              <a:rPr lang="en-GB" sz="2400" dirty="0">
+                <a:solidFill>
+                  <a:schemeClr val="accent3"/>
+                </a:solidFill>
+              </a:rPr>
+              <a:t>Documentary archive at </a:t>
+            </a:r>
+            <a:r>
+              <a:rPr lang="en-GB" sz="2400" dirty="0" err="1">
+                <a:solidFill>
+                  <a:schemeClr val="accent3"/>
+                </a:solidFill>
+              </a:rPr>
               <a:t>spacksites</a:t>
             </a:r>
             <a:r>
-              <a:rPr lang="en-US" dirty="0"/>
-              <a:t>/</a:t>
-            </a:r>
-            <a:r>
-              <a:rPr lang="en-GB" dirty="0"/>
-              <a:t>README.md – a general user guide</a:t>
-            </a:r>
+              <a:rPr lang="en-GB" sz="2400" dirty="0">
+                <a:solidFill>
+                  <a:schemeClr val="accent3"/>
+                </a:solidFill>
+              </a:rPr>
+              <a:t>/spack-env-archive</a:t>
+            </a:r>
+          </a:p>
+          <a:p>
+            <a:endParaRPr lang="en-GB" sz="2400" dirty="0"/>
           </a:p>
         </p:txBody>
       </p:sp>
@@ -12013,7 +12798,7 @@
           <p:cNvPr id="4" name="Slide Number Placeholder 3">
             <a:extLst>
               <a:ext uri="{FF2B5EF4-FFF2-40B4-BE49-F238E27FC236}">
-                <a16:creationId xmlns:a16="http://schemas.microsoft.com/office/drawing/2014/main" id="{285C55A8-347B-2884-2A20-68E39433334C}"/>
+                <a16:creationId xmlns:a16="http://schemas.microsoft.com/office/drawing/2014/main" id="{ECA19F4D-DC95-8F39-D55D-74F773B492EA}"/>
               </a:ext>
             </a:extLst>
           </p:cNvPr>
@@ -12038,10 +12823,49 @@
           </a:p>
         </p:txBody>
       </p:sp>
+      <p:sp>
+        <p:nvSpPr>
+          <p:cNvPr id="5" name="TextBox 4">
+            <a:extLst>
+              <a:ext uri="{FF2B5EF4-FFF2-40B4-BE49-F238E27FC236}">
+                <a16:creationId xmlns:a16="http://schemas.microsoft.com/office/drawing/2014/main" id="{FF5E309C-A148-B072-A1FA-B3B01E6427E4}"/>
+              </a:ext>
+            </a:extLst>
+          </p:cNvPr>
+          <p:cNvSpPr txBox="1"/>
+          <p:nvPr/>
+        </p:nvSpPr>
+        <p:spPr>
+          <a:xfrm>
+            <a:off x="2346384" y="5572664"/>
+            <a:ext cx="6047117" cy="369332"/>
+          </a:xfrm>
+          <a:prstGeom prst="rect">
+            <a:avLst/>
+          </a:prstGeom>
+          <a:noFill/>
+        </p:spPr>
+        <p:txBody>
+          <a:bodyPr wrap="square" rtlCol="0">
+            <a:spAutoFit/>
+          </a:bodyPr>
+          <a:lstStyle/>
+          <a:p>
+            <a:r>
+              <a:rPr lang="en-GB" dirty="0">
+                <a:solidFill>
+                  <a:schemeClr val="accent3"/>
+                </a:solidFill>
+              </a:rPr>
+              <a:t>This colour = not yet implemented</a:t>
+            </a:r>
+          </a:p>
+        </p:txBody>
+      </p:sp>
     </p:spTree>
     <p:extLst>
       <p:ext uri="{BB962C8B-B14F-4D97-AF65-F5344CB8AC3E}">
-        <p14:creationId xmlns:p14="http://schemas.microsoft.com/office/powerpoint/2010/main" val="2410783264"/>
+        <p14:creationId xmlns:p14="http://schemas.microsoft.com/office/powerpoint/2010/main" val="826630174"/>
       </p:ext>
     </p:extLst>
   </p:cSld>
@@ -12073,7 +12897,7 @@
           <p:cNvPr id="2" name="Title 1">
             <a:extLst>
               <a:ext uri="{FF2B5EF4-FFF2-40B4-BE49-F238E27FC236}">
-                <a16:creationId xmlns:a16="http://schemas.microsoft.com/office/drawing/2014/main" id="{255983E5-BD18-214A-337A-90E64039E24E}"/>
+                <a16:creationId xmlns:a16="http://schemas.microsoft.com/office/drawing/2014/main" id="{7D3D9DD2-C208-5563-4169-88EDA00C3D5E}"/>
               </a:ext>
             </a:extLst>
           </p:cNvPr>
@@ -12091,17 +12915,17 @@
           <a:p>
             <a:r>
               <a:rPr lang="en-GB" dirty="0"/>
-              <a:t>Directory layout</a:t>
+              <a:t>Documents</a:t>
             </a:r>
           </a:p>
         </p:txBody>
       </p:sp>
       <p:sp>
         <p:nvSpPr>
-          <p:cNvPr id="5" name="Text Placeholder 4">
-            <a:extLst>
-              <a:ext uri="{FF2B5EF4-FFF2-40B4-BE49-F238E27FC236}">
-                <a16:creationId xmlns:a16="http://schemas.microsoft.com/office/drawing/2014/main" id="{C90E4E41-23B3-7BC3-39CA-850993295486}"/>
+          <p:cNvPr id="3" name="Content Placeholder 2">
+            <a:extLst>
+              <a:ext uri="{FF2B5EF4-FFF2-40B4-BE49-F238E27FC236}">
+                <a16:creationId xmlns:a16="http://schemas.microsoft.com/office/drawing/2014/main" id="{2E1DA8A9-92E2-F1B2-53E6-BA5B2E14B462}"/>
               </a:ext>
             </a:extLst>
           </p:cNvPr>
@@ -12109,7 +12933,7 @@
             <a:spLocks noGrp="1"/>
           </p:cNvSpPr>
           <p:nvPr>
-            <p:ph type="body" idx="1"/>
+            <p:ph idx="1"/>
           </p:nvPr>
         </p:nvSpPr>
         <p:spPr/>
@@ -12118,18 +12942,37 @@
           <a:lstStyle/>
           <a:p>
             <a:r>
+              <a:rPr lang="en-US" dirty="0"/>
+              <a:t>spacksites/Developing_on_Myriad.md – how to work on the existing site set on Myriad as </a:t>
+            </a:r>
+            <a:r>
+              <a:rPr lang="en-US" dirty="0" err="1"/>
+              <a:t>ccspapp</a:t>
+            </a:r>
+            <a:endParaRPr lang="en-US" dirty="0"/>
+          </a:p>
+          <a:p>
+            <a:r>
+              <a:rPr lang="en-US" dirty="0" err="1"/>
+              <a:t>spacksites</a:t>
+            </a:r>
+            <a:r>
+              <a:rPr lang="en-US" dirty="0"/>
+              <a:t>/</a:t>
+            </a:r>
+            <a:r>
               <a:rPr lang="en-GB" dirty="0"/>
-              <a:t>Tree</a:t>
+              <a:t>README.md – a general user guide</a:t>
             </a:r>
           </a:p>
         </p:txBody>
       </p:sp>
       <p:sp>
         <p:nvSpPr>
-          <p:cNvPr id="3" name="Content Placeholder 2">
-            <a:extLst>
-              <a:ext uri="{FF2B5EF4-FFF2-40B4-BE49-F238E27FC236}">
-                <a16:creationId xmlns:a16="http://schemas.microsoft.com/office/drawing/2014/main" id="{F7B6845C-762C-9B49-0C8B-BD22560814B5}"/>
+          <p:cNvPr id="4" name="Slide Number Placeholder 3">
+            <a:extLst>
+              <a:ext uri="{FF2B5EF4-FFF2-40B4-BE49-F238E27FC236}">
+                <a16:creationId xmlns:a16="http://schemas.microsoft.com/office/drawing/2014/main" id="{285C55A8-347B-2884-2A20-68E39433334C}"/>
               </a:ext>
             </a:extLst>
           </p:cNvPr>
@@ -12137,651 +12980,7 @@
             <a:spLocks noGrp="1"/>
           </p:cNvSpPr>
           <p:nvPr>
-            <p:ph sz="half" idx="2"/>
-          </p:nvPr>
-        </p:nvSpPr>
-        <p:spPr>
-          <a:xfrm>
-            <a:off x="1444752" y="2505075"/>
-            <a:ext cx="3765603" cy="3684588"/>
-          </a:xfrm>
-        </p:spPr>
-        <p:txBody>
-          <a:bodyPr numCol="2">
-            <a:noAutofit/>
-          </a:bodyPr>
-          <a:lstStyle/>
-          <a:p>
-            <a:pPr marL="0" indent="0">
-              <a:lnSpc>
-                <a:spcPct val="120000"/>
-              </a:lnSpc>
-              <a:spcBef>
-                <a:spcPts val="0"/>
-              </a:spcBef>
-              <a:buNone/>
-            </a:pPr>
-            <a:r>
-              <a:rPr lang="en-GB" sz="1050" dirty="0"/>
-              <a:t>[ccspapp@login13 spack-test]$ tree -L 2</a:t>
-            </a:r>
-          </a:p>
-          <a:p>
-            <a:pPr marL="0" indent="0">
-              <a:lnSpc>
-                <a:spcPct val="120000"/>
-              </a:lnSpc>
-              <a:spcBef>
-                <a:spcPts val="0"/>
-              </a:spcBef>
-              <a:buNone/>
-            </a:pPr>
-            <a:r>
-              <a:rPr lang="en-GB" sz="1050" dirty="0"/>
-              <a:t>.</a:t>
-            </a:r>
-          </a:p>
-          <a:p>
-            <a:pPr marL="0" indent="0">
-              <a:lnSpc>
-                <a:spcPct val="120000"/>
-              </a:lnSpc>
-              <a:spcBef>
-                <a:spcPts val="0"/>
-              </a:spcBef>
-              <a:buNone/>
-            </a:pPr>
-            <a:r>
-              <a:rPr lang="en-GB" sz="1050" dirty="0"/>
-              <a:t>├── </a:t>
-            </a:r>
-            <a:r>
-              <a:rPr lang="en-GB" sz="1050" dirty="0" err="1"/>
-              <a:t>buildcache</a:t>
-            </a:r>
-            <a:endParaRPr lang="en-GB" sz="1050" dirty="0"/>
-          </a:p>
-          <a:p>
-            <a:pPr marL="0" indent="0">
-              <a:lnSpc>
-                <a:spcPct val="120000"/>
-              </a:lnSpc>
-              <a:spcBef>
-                <a:spcPts val="0"/>
-              </a:spcBef>
-              <a:buNone/>
-            </a:pPr>
-            <a:r>
-              <a:rPr lang="en-GB" sz="1050" dirty="0"/>
-              <a:t>│   └── </a:t>
-            </a:r>
-            <a:r>
-              <a:rPr lang="en-GB" sz="1050" dirty="0" err="1"/>
-              <a:t>build_cache</a:t>
-            </a:r>
-            <a:endParaRPr lang="en-GB" sz="1050" dirty="0"/>
-          </a:p>
-          <a:p>
-            <a:pPr marL="0" indent="0">
-              <a:lnSpc>
-                <a:spcPct val="120000"/>
-              </a:lnSpc>
-              <a:spcBef>
-                <a:spcPts val="0"/>
-              </a:spcBef>
-              <a:buNone/>
-            </a:pPr>
-            <a:r>
-              <a:rPr lang="en-GB" sz="1050" dirty="0"/>
-              <a:t>├── demo-site1</a:t>
-            </a:r>
-          </a:p>
-          <a:p>
-            <a:pPr marL="0" indent="0">
-              <a:lnSpc>
-                <a:spcPct val="120000"/>
-              </a:lnSpc>
-              <a:spcBef>
-                <a:spcPts val="0"/>
-              </a:spcBef>
-              <a:buNone/>
-            </a:pPr>
-            <a:r>
-              <a:rPr lang="en-GB" sz="1050" dirty="0"/>
-              <a:t>│   ├── </a:t>
-            </a:r>
-            <a:r>
-              <a:rPr lang="en-GB" sz="1050" dirty="0" err="1"/>
-              <a:t>build_stage</a:t>
-            </a:r>
-            <a:endParaRPr lang="en-GB" sz="1050" dirty="0"/>
-          </a:p>
-          <a:p>
-            <a:pPr marL="0" indent="0">
-              <a:lnSpc>
-                <a:spcPct val="120000"/>
-              </a:lnSpc>
-              <a:spcBef>
-                <a:spcPts val="0"/>
-              </a:spcBef>
-              <a:buNone/>
-            </a:pPr>
-            <a:r>
-              <a:rPr lang="en-GB" sz="1050" dirty="0"/>
-              <a:t>│   ├── modules</a:t>
-            </a:r>
-          </a:p>
-          <a:p>
-            <a:pPr marL="0" indent="0">
-              <a:lnSpc>
-                <a:spcPct val="120000"/>
-              </a:lnSpc>
-              <a:spcBef>
-                <a:spcPts val="0"/>
-              </a:spcBef>
-              <a:buNone/>
-            </a:pPr>
-            <a:r>
-              <a:rPr lang="en-GB" sz="1050" dirty="0"/>
-              <a:t>│   ├── provenance</a:t>
-            </a:r>
-          </a:p>
-          <a:p>
-            <a:pPr marL="0" indent="0">
-              <a:lnSpc>
-                <a:spcPct val="120000"/>
-              </a:lnSpc>
-              <a:spcBef>
-                <a:spcPts val="0"/>
-              </a:spcBef>
-              <a:buNone/>
-            </a:pPr>
-            <a:r>
-              <a:rPr lang="en-GB" sz="1050" dirty="0"/>
-              <a:t>│   └── spack</a:t>
-            </a:r>
-          </a:p>
-          <a:p>
-            <a:pPr marL="0" indent="0">
-              <a:lnSpc>
-                <a:spcPct val="120000"/>
-              </a:lnSpc>
-              <a:spcBef>
-                <a:spcPts val="0"/>
-              </a:spcBef>
-              <a:buNone/>
-            </a:pPr>
-            <a:r>
-              <a:rPr lang="en-GB" sz="1050" dirty="0"/>
-              <a:t>├── gcc12</a:t>
-            </a:r>
-          </a:p>
-          <a:p>
-            <a:pPr marL="0" indent="0">
-              <a:lnSpc>
-                <a:spcPct val="120000"/>
-              </a:lnSpc>
-              <a:spcBef>
-                <a:spcPts val="0"/>
-              </a:spcBef>
-              <a:buNone/>
-            </a:pPr>
-            <a:r>
-              <a:rPr lang="en-GB" sz="1050" dirty="0"/>
-              <a:t>│   ├── </a:t>
-            </a:r>
-            <a:r>
-              <a:rPr lang="en-GB" sz="1050" dirty="0" err="1"/>
-              <a:t>build_stage</a:t>
-            </a:r>
-            <a:endParaRPr lang="en-GB" sz="1050" dirty="0"/>
-          </a:p>
-          <a:p>
-            <a:pPr marL="0" indent="0">
-              <a:lnSpc>
-                <a:spcPct val="120000"/>
-              </a:lnSpc>
-              <a:spcBef>
-                <a:spcPts val="0"/>
-              </a:spcBef>
-              <a:buNone/>
-            </a:pPr>
-            <a:r>
-              <a:rPr lang="en-GB" sz="1050" dirty="0"/>
-              <a:t>│   ├── modules</a:t>
-            </a:r>
-          </a:p>
-          <a:p>
-            <a:pPr marL="0" indent="0">
-              <a:lnSpc>
-                <a:spcPct val="120000"/>
-              </a:lnSpc>
-              <a:spcBef>
-                <a:spcPts val="0"/>
-              </a:spcBef>
-              <a:buNone/>
-            </a:pPr>
-            <a:r>
-              <a:rPr lang="en-GB" sz="1050" dirty="0"/>
-              <a:t>│   ├── provenance</a:t>
-            </a:r>
-          </a:p>
-          <a:p>
-            <a:pPr marL="0" indent="0">
-              <a:lnSpc>
-                <a:spcPct val="120000"/>
-              </a:lnSpc>
-              <a:spcBef>
-                <a:spcPts val="0"/>
-              </a:spcBef>
-              <a:buNone/>
-            </a:pPr>
-            <a:r>
-              <a:rPr lang="en-GB" sz="1050" dirty="0"/>
-              <a:t>│   └── spack</a:t>
-            </a:r>
-          </a:p>
-          <a:p>
-            <a:pPr marL="0" indent="0">
-              <a:lnSpc>
-                <a:spcPct val="120000"/>
-              </a:lnSpc>
-              <a:spcBef>
-                <a:spcPts val="0"/>
-              </a:spcBef>
-              <a:buNone/>
-            </a:pPr>
-            <a:r>
-              <a:rPr lang="en-GB" sz="1050" dirty="0"/>
-              <a:t>├── site1</a:t>
-            </a:r>
-          </a:p>
-          <a:p>
-            <a:pPr marL="0" indent="0">
-              <a:lnSpc>
-                <a:spcPct val="120000"/>
-              </a:lnSpc>
-              <a:spcBef>
-                <a:spcPts val="0"/>
-              </a:spcBef>
-              <a:buNone/>
-            </a:pPr>
-            <a:r>
-              <a:rPr lang="en-GB" sz="1050" dirty="0"/>
-              <a:t>│   ├── </a:t>
-            </a:r>
-            <a:r>
-              <a:rPr lang="en-GB" sz="1050" dirty="0" err="1"/>
-              <a:t>build_stage</a:t>
-            </a:r>
-            <a:endParaRPr lang="en-GB" sz="1050" dirty="0"/>
-          </a:p>
-          <a:p>
-            <a:pPr marL="0" indent="0">
-              <a:lnSpc>
-                <a:spcPct val="120000"/>
-              </a:lnSpc>
-              <a:spcBef>
-                <a:spcPts val="0"/>
-              </a:spcBef>
-              <a:buNone/>
-            </a:pPr>
-            <a:r>
-              <a:rPr lang="en-GB" sz="1050" dirty="0"/>
-              <a:t>│   ├── modules</a:t>
-            </a:r>
-          </a:p>
-          <a:p>
-            <a:pPr marL="0" indent="0">
-              <a:lnSpc>
-                <a:spcPct val="120000"/>
-              </a:lnSpc>
-              <a:spcBef>
-                <a:spcPts val="0"/>
-              </a:spcBef>
-              <a:buNone/>
-            </a:pPr>
-            <a:r>
-              <a:rPr lang="en-GB" sz="1050" dirty="0"/>
-              <a:t>│   ├── provenance</a:t>
-            </a:r>
-          </a:p>
-          <a:p>
-            <a:pPr marL="0" indent="0">
-              <a:lnSpc>
-                <a:spcPct val="120000"/>
-              </a:lnSpc>
-              <a:spcBef>
-                <a:spcPts val="0"/>
-              </a:spcBef>
-              <a:buNone/>
-            </a:pPr>
-            <a:r>
-              <a:rPr lang="en-GB" sz="1050" dirty="0"/>
-              <a:t>│   └── spack</a:t>
-            </a:r>
-          </a:p>
-          <a:p>
-            <a:pPr marL="0" indent="0">
-              <a:lnSpc>
-                <a:spcPct val="120000"/>
-              </a:lnSpc>
-              <a:spcBef>
-                <a:spcPts val="0"/>
-              </a:spcBef>
-              <a:buNone/>
-            </a:pPr>
-            <a:r>
-              <a:rPr lang="en-GB" sz="1050" dirty="0"/>
-              <a:t>├── site2</a:t>
-            </a:r>
-          </a:p>
-          <a:p>
-            <a:pPr marL="0" indent="0">
-              <a:lnSpc>
-                <a:spcPct val="120000"/>
-              </a:lnSpc>
-              <a:spcBef>
-                <a:spcPts val="0"/>
-              </a:spcBef>
-              <a:buNone/>
-            </a:pPr>
-            <a:r>
-              <a:rPr lang="en-GB" sz="1050" dirty="0"/>
-              <a:t>│   ├── </a:t>
-            </a:r>
-            <a:r>
-              <a:rPr lang="en-GB" sz="1050" dirty="0" err="1"/>
-              <a:t>build_stage</a:t>
-            </a:r>
-            <a:endParaRPr lang="en-GB" sz="1050" dirty="0"/>
-          </a:p>
-          <a:p>
-            <a:pPr marL="0" indent="0">
-              <a:lnSpc>
-                <a:spcPct val="120000"/>
-              </a:lnSpc>
-              <a:spcBef>
-                <a:spcPts val="0"/>
-              </a:spcBef>
-              <a:buNone/>
-            </a:pPr>
-            <a:r>
-              <a:rPr lang="en-GB" sz="1050" dirty="0"/>
-              <a:t>│   ├── modules</a:t>
-            </a:r>
-          </a:p>
-          <a:p>
-            <a:pPr marL="0" indent="0">
-              <a:lnSpc>
-                <a:spcPct val="120000"/>
-              </a:lnSpc>
-              <a:spcBef>
-                <a:spcPts val="0"/>
-              </a:spcBef>
-              <a:buNone/>
-            </a:pPr>
-            <a:r>
-              <a:rPr lang="en-GB" sz="1050" dirty="0"/>
-              <a:t>│   ├── provenance</a:t>
-            </a:r>
-          </a:p>
-          <a:p>
-            <a:pPr marL="0" indent="0">
-              <a:lnSpc>
-                <a:spcPct val="120000"/>
-              </a:lnSpc>
-              <a:spcBef>
-                <a:spcPts val="0"/>
-              </a:spcBef>
-              <a:buNone/>
-            </a:pPr>
-            <a:r>
-              <a:rPr lang="en-GB" sz="1050" dirty="0"/>
-              <a:t>│   └── spack</a:t>
-            </a:r>
-          </a:p>
-          <a:p>
-            <a:pPr marL="0" indent="0">
-              <a:lnSpc>
-                <a:spcPct val="120000"/>
-              </a:lnSpc>
-              <a:spcBef>
-                <a:spcPts val="0"/>
-              </a:spcBef>
-              <a:buNone/>
-            </a:pPr>
-            <a:r>
-              <a:rPr lang="en-GB" sz="1050" dirty="0"/>
-              <a:t>├── site3</a:t>
-            </a:r>
-          </a:p>
-          <a:p>
-            <a:pPr marL="0" indent="0">
-              <a:lnSpc>
-                <a:spcPct val="120000"/>
-              </a:lnSpc>
-              <a:spcBef>
-                <a:spcPts val="0"/>
-              </a:spcBef>
-              <a:buNone/>
-            </a:pPr>
-            <a:r>
-              <a:rPr lang="en-GB" sz="1050" dirty="0"/>
-              <a:t>│   ├── </a:t>
-            </a:r>
-            <a:r>
-              <a:rPr lang="en-GB" sz="1050" dirty="0" err="1"/>
-              <a:t>build_stage</a:t>
-            </a:r>
-            <a:endParaRPr lang="en-GB" sz="1050" dirty="0"/>
-          </a:p>
-          <a:p>
-            <a:pPr marL="0" indent="0">
-              <a:lnSpc>
-                <a:spcPct val="120000"/>
-              </a:lnSpc>
-              <a:spcBef>
-                <a:spcPts val="0"/>
-              </a:spcBef>
-              <a:buNone/>
-            </a:pPr>
-            <a:r>
-              <a:rPr lang="en-GB" sz="1050" dirty="0"/>
-              <a:t>│   ├── modules</a:t>
-            </a:r>
-          </a:p>
-          <a:p>
-            <a:pPr marL="0" indent="0">
-              <a:lnSpc>
-                <a:spcPct val="120000"/>
-              </a:lnSpc>
-              <a:spcBef>
-                <a:spcPts val="0"/>
-              </a:spcBef>
-              <a:buNone/>
-            </a:pPr>
-            <a:r>
-              <a:rPr lang="en-GB" sz="1050" dirty="0"/>
-              <a:t>│   ├── provenance</a:t>
-            </a:r>
-          </a:p>
-          <a:p>
-            <a:pPr marL="0" indent="0">
-              <a:lnSpc>
-                <a:spcPct val="120000"/>
-              </a:lnSpc>
-              <a:spcBef>
-                <a:spcPts val="0"/>
-              </a:spcBef>
-              <a:buNone/>
-            </a:pPr>
-            <a:r>
-              <a:rPr lang="en-GB" sz="1050" dirty="0"/>
-              <a:t>│   └── spack</a:t>
-            </a:r>
-          </a:p>
-          <a:p>
-            <a:pPr marL="0" indent="0">
-              <a:lnSpc>
-                <a:spcPct val="120000"/>
-              </a:lnSpc>
-              <a:spcBef>
-                <a:spcPts val="0"/>
-              </a:spcBef>
-              <a:buNone/>
-            </a:pPr>
-            <a:r>
-              <a:rPr lang="en-GB" sz="1050" dirty="0"/>
-              <a:t>├── site4</a:t>
-            </a:r>
-          </a:p>
-          <a:p>
-            <a:pPr marL="0" indent="0">
-              <a:lnSpc>
-                <a:spcPct val="120000"/>
-              </a:lnSpc>
-              <a:spcBef>
-                <a:spcPts val="0"/>
-              </a:spcBef>
-              <a:buNone/>
-            </a:pPr>
-            <a:r>
-              <a:rPr lang="en-GB" sz="1050" dirty="0"/>
-              <a:t>│   ├── </a:t>
-            </a:r>
-            <a:r>
-              <a:rPr lang="en-GB" sz="1050" dirty="0" err="1"/>
-              <a:t>build_stage</a:t>
-            </a:r>
-            <a:endParaRPr lang="en-GB" sz="1050" dirty="0"/>
-          </a:p>
-          <a:p>
-            <a:pPr marL="0" indent="0">
-              <a:lnSpc>
-                <a:spcPct val="120000"/>
-              </a:lnSpc>
-              <a:spcBef>
-                <a:spcPts val="0"/>
-              </a:spcBef>
-              <a:buNone/>
-            </a:pPr>
-            <a:r>
-              <a:rPr lang="en-GB" sz="1050" dirty="0"/>
-              <a:t>│   ├── provenance</a:t>
-            </a:r>
-          </a:p>
-          <a:p>
-            <a:pPr marL="0" indent="0">
-              <a:lnSpc>
-                <a:spcPct val="120000"/>
-              </a:lnSpc>
-              <a:spcBef>
-                <a:spcPts val="0"/>
-              </a:spcBef>
-              <a:buNone/>
-            </a:pPr>
-            <a:r>
-              <a:rPr lang="en-GB" sz="1050" dirty="0"/>
-              <a:t>│   └── spack</a:t>
-            </a:r>
-          </a:p>
-          <a:p>
-            <a:pPr marL="0" indent="0">
-              <a:lnSpc>
-                <a:spcPct val="120000"/>
-              </a:lnSpc>
-              <a:spcBef>
-                <a:spcPts val="0"/>
-              </a:spcBef>
-              <a:buNone/>
-            </a:pPr>
-            <a:r>
-              <a:rPr lang="en-GB" sz="1050" dirty="0"/>
-              <a:t>└── site5</a:t>
-            </a:r>
-          </a:p>
-          <a:p>
-            <a:pPr marL="0" indent="0">
-              <a:lnSpc>
-                <a:spcPct val="120000"/>
-              </a:lnSpc>
-              <a:spcBef>
-                <a:spcPts val="0"/>
-              </a:spcBef>
-              <a:buNone/>
-            </a:pPr>
-            <a:r>
-              <a:rPr lang="en-GB" sz="1050" dirty="0"/>
-              <a:t>    ├── </a:t>
-            </a:r>
-            <a:r>
-              <a:rPr lang="en-GB" sz="1050" dirty="0" err="1"/>
-              <a:t>build_stage</a:t>
-            </a:r>
-            <a:endParaRPr lang="en-GB" sz="1050" dirty="0"/>
-          </a:p>
-          <a:p>
-            <a:pPr marL="0" indent="0">
-              <a:lnSpc>
-                <a:spcPct val="120000"/>
-              </a:lnSpc>
-              <a:spcBef>
-                <a:spcPts val="0"/>
-              </a:spcBef>
-              <a:buNone/>
-            </a:pPr>
-            <a:r>
-              <a:rPr lang="en-GB" sz="1050" dirty="0"/>
-              <a:t>    ├── modules</a:t>
-            </a:r>
-          </a:p>
-          <a:p>
-            <a:pPr marL="0" indent="0">
-              <a:lnSpc>
-                <a:spcPct val="120000"/>
-              </a:lnSpc>
-              <a:spcBef>
-                <a:spcPts val="0"/>
-              </a:spcBef>
-              <a:buNone/>
-            </a:pPr>
-            <a:r>
-              <a:rPr lang="en-GB" sz="1050" dirty="0"/>
-              <a:t>    ├── provenance</a:t>
-            </a:r>
-          </a:p>
-          <a:p>
-            <a:pPr marL="0" indent="0">
-              <a:lnSpc>
-                <a:spcPct val="120000"/>
-              </a:lnSpc>
-              <a:spcBef>
-                <a:spcPts val="0"/>
-              </a:spcBef>
-              <a:buNone/>
-            </a:pPr>
-            <a:r>
-              <a:rPr lang="en-GB" sz="1050" dirty="0"/>
-              <a:t>    └── spack</a:t>
-            </a:r>
-          </a:p>
-        </p:txBody>
-      </p:sp>
-      <p:sp>
-        <p:nvSpPr>
-          <p:cNvPr id="6" name="Text Placeholder 5">
-            <a:extLst>
-              <a:ext uri="{FF2B5EF4-FFF2-40B4-BE49-F238E27FC236}">
-                <a16:creationId xmlns:a16="http://schemas.microsoft.com/office/drawing/2014/main" id="{9D8A3AF3-07EA-B3F0-6AE6-887AA996E215}"/>
-              </a:ext>
-            </a:extLst>
-          </p:cNvPr>
-          <p:cNvSpPr>
-            <a:spLocks noGrp="1"/>
-          </p:cNvSpPr>
-          <p:nvPr>
-            <p:ph type="body" sz="quarter" idx="3"/>
+            <p:ph type="sldNum" sz="quarter" idx="12"/>
           </p:nvPr>
         </p:nvSpPr>
         <p:spPr/>
@@ -12789,203 +12988,6 @@
           <a:bodyPr/>
           <a:lstStyle/>
           <a:p>
-            <a:r>
-              <a:rPr lang="en-GB" dirty="0"/>
-              <a:t>Notes</a:t>
-            </a:r>
-          </a:p>
-        </p:txBody>
-      </p:sp>
-      <p:sp>
-        <p:nvSpPr>
-          <p:cNvPr id="7" name="Content Placeholder 6">
-            <a:extLst>
-              <a:ext uri="{FF2B5EF4-FFF2-40B4-BE49-F238E27FC236}">
-                <a16:creationId xmlns:a16="http://schemas.microsoft.com/office/drawing/2014/main" id="{860B00DE-A02F-6FC5-C678-0BFF9DC4FDDD}"/>
-              </a:ext>
-            </a:extLst>
-          </p:cNvPr>
-          <p:cNvSpPr>
-            <a:spLocks noGrp="1"/>
-          </p:cNvSpPr>
-          <p:nvPr>
-            <p:ph sz="quarter" idx="4"/>
-          </p:nvPr>
-        </p:nvSpPr>
-        <p:spPr>
-          <a:xfrm>
-            <a:off x="5210355" y="2505075"/>
-            <a:ext cx="6128205" cy="3684588"/>
-          </a:xfrm>
-        </p:spPr>
-        <p:txBody>
-          <a:bodyPr>
-            <a:normAutofit fontScale="85000" lnSpcReduction="20000"/>
-          </a:bodyPr>
-          <a:lstStyle/>
-          <a:p>
-            <a:r>
-              <a:rPr lang="en-GB" dirty="0"/>
-              <a:t>These are on Myriad at </a:t>
-            </a:r>
-            <a:br>
-              <a:rPr lang="en-GB" dirty="0"/>
-            </a:br>
-            <a:r>
-              <a:rPr lang="en-GB" b="0" i="0" dirty="0">
-                <a:effectLst/>
-                <a:latin typeface="Consolas" panose="020B0609020204030204" pitchFamily="49" charset="0"/>
-              </a:rPr>
-              <a:t>/shared/</a:t>
-            </a:r>
-            <a:r>
-              <a:rPr lang="en-GB" b="0" i="0" dirty="0" err="1">
-                <a:effectLst/>
-                <a:latin typeface="Consolas" panose="020B0609020204030204" pitchFamily="49" charset="0"/>
-              </a:rPr>
-              <a:t>ucl</a:t>
-            </a:r>
-            <a:r>
-              <a:rPr lang="en-GB" b="0" i="0" dirty="0">
-                <a:effectLst/>
-                <a:latin typeface="Consolas" panose="020B0609020204030204" pitchFamily="49" charset="0"/>
-              </a:rPr>
-              <a:t>/apps/spack-test</a:t>
-            </a:r>
-          </a:p>
-          <a:p>
-            <a:r>
-              <a:rPr lang="en-GB" dirty="0"/>
-              <a:t>1</a:t>
-            </a:r>
-            <a:r>
-              <a:rPr lang="en-GB" baseline="30000" dirty="0"/>
-              <a:t>st</a:t>
-            </a:r>
-            <a:r>
-              <a:rPr lang="en-GB" dirty="0"/>
-              <a:t> level are per spack site, but the actual respective spack site is at the 2</a:t>
-            </a:r>
-            <a:r>
-              <a:rPr lang="en-GB" baseline="30000" dirty="0"/>
-              <a:t>nd</a:t>
-            </a:r>
-            <a:r>
-              <a:rPr lang="en-GB" dirty="0"/>
-              <a:t> level below that</a:t>
-            </a:r>
-          </a:p>
-          <a:p>
-            <a:r>
-              <a:rPr lang="en-GB" dirty="0"/>
-              <a:t>Respective build stage – so not to fill </a:t>
-            </a:r>
-            <a:r>
-              <a:rPr lang="en-GB" dirty="0" err="1"/>
-              <a:t>ccspapp</a:t>
-            </a:r>
-            <a:r>
-              <a:rPr lang="en-GB" dirty="0"/>
-              <a:t> space</a:t>
-            </a:r>
-          </a:p>
-          <a:p>
-            <a:r>
-              <a:rPr lang="en-GB" dirty="0"/>
-              <a:t>Respective modules/ modules for a site will go here – </a:t>
-            </a:r>
-            <a:r>
-              <a:rPr lang="en-GB" dirty="0">
-                <a:solidFill>
-                  <a:schemeClr val="accent3"/>
-                </a:solidFill>
-              </a:rPr>
-              <a:t>sub directories per module list section that we have now</a:t>
-            </a:r>
-          </a:p>
-          <a:p>
-            <a:r>
-              <a:rPr lang="en-GB" dirty="0">
-                <a:solidFill>
-                  <a:schemeClr val="accent3"/>
-                </a:solidFill>
-              </a:rPr>
-              <a:t>Respective provenance/ - a record of how site was built (needed?) </a:t>
-            </a:r>
-            <a:r>
-              <a:rPr lang="en-GB" dirty="0" err="1">
-                <a:solidFill>
-                  <a:schemeClr val="accent3"/>
-                </a:solidFill>
-              </a:rPr>
-              <a:t>cf</a:t>
-            </a:r>
-            <a:r>
-              <a:rPr lang="en-GB" dirty="0">
-                <a:solidFill>
-                  <a:schemeClr val="accent3"/>
-                </a:solidFill>
-              </a:rPr>
-              <a:t> archive</a:t>
-            </a:r>
-          </a:p>
-          <a:p>
-            <a:r>
-              <a:rPr lang="en-GB" dirty="0" err="1"/>
-              <a:t>Buildcache</a:t>
-            </a:r>
-            <a:r>
-              <a:rPr lang="en-GB" dirty="0"/>
-              <a:t> – all sites use this to retrieve built packages. Need to push built packages here</a:t>
-            </a:r>
-          </a:p>
-          <a:p>
-            <a:r>
-              <a:rPr lang="en-GB" dirty="0"/>
-              <a:t>gcc12 site – </a:t>
-            </a:r>
-            <a:r>
-              <a:rPr lang="en-GB" dirty="0" err="1"/>
-              <a:t>gcc</a:t>
-            </a:r>
-            <a:r>
-              <a:rPr lang="en-GB" dirty="0"/>
-              <a:t> and deps were built here and pushed to </a:t>
-            </a:r>
-            <a:r>
-              <a:rPr lang="en-GB" dirty="0" err="1"/>
-              <a:t>buildcache</a:t>
-            </a:r>
-            <a:endParaRPr lang="en-GB" dirty="0"/>
-          </a:p>
-        </p:txBody>
-      </p:sp>
-      <p:sp>
-        <p:nvSpPr>
-          <p:cNvPr id="4" name="Slide Number Placeholder 3">
-            <a:extLst>
-              <a:ext uri="{FF2B5EF4-FFF2-40B4-BE49-F238E27FC236}">
-                <a16:creationId xmlns:a16="http://schemas.microsoft.com/office/drawing/2014/main" id="{F299CD00-615E-73E2-0C58-1740C1523663}"/>
-              </a:ext>
-            </a:extLst>
-          </p:cNvPr>
-          <p:cNvSpPr>
-            <a:spLocks noGrp="1"/>
-          </p:cNvSpPr>
-          <p:nvPr>
-            <p:ph type="sldNum" sz="quarter" idx="4294967295"/>
-          </p:nvPr>
-        </p:nvSpPr>
-        <p:spPr>
-          <a:xfrm>
-            <a:off x="9448800" y="6356350"/>
-            <a:ext cx="2743200" cy="365125"/>
-          </a:xfrm>
-        </p:spPr>
-        <p:txBody>
-          <a:bodyPr/>
-          <a:lstStyle/>
-          <a:p>
             <a:pPr rtl="0"/>
             <a:fld id="{D8DA9DAA-006C-4F4B-980E-E3DF019B24E2}" type="slidenum">
               <a:rPr lang="en-GB" noProof="0" smtClean="0"/>
@@ -12998,7 +13000,7 @@
     </p:spTree>
     <p:extLst>
       <p:ext uri="{BB962C8B-B14F-4D97-AF65-F5344CB8AC3E}">
-        <p14:creationId xmlns:p14="http://schemas.microsoft.com/office/powerpoint/2010/main" val="1508535455"/>
+        <p14:creationId xmlns:p14="http://schemas.microsoft.com/office/powerpoint/2010/main" val="2410783264"/>
       </p:ext>
     </p:extLst>
   </p:cSld>
@@ -13309,41 +13311,18 @@
                 <a:ea typeface="Cascadia Code SemiBold" panose="020B0609020000020004" pitchFamily="49" charset="0"/>
                 <a:cs typeface="Cascadia Code SemiBold" panose="020B0609020000020004" pitchFamily="49" charset="0"/>
               </a:rPr>
-              <a:t> &lt;sub command</a:t>
-            </a:r>
-            <a:r>
-              <a:rPr lang="en-GB">
-                <a:latin typeface="Cascadia Code SemiBold" panose="020B0609020000020004" pitchFamily="49" charset="0"/>
-                <a:ea typeface="Cascadia Code SemiBold" panose="020B0609020000020004" pitchFamily="49" charset="0"/>
-                <a:cs typeface="Cascadia Code SemiBold" panose="020B0609020000020004" pitchFamily="49" charset="0"/>
-              </a:rPr>
-              <a:t>&gt; –-help </a:t>
-            </a:r>
-            <a:r>
-              <a:rPr lang="en-GB"/>
+              <a:t> &lt;sub command&gt; –-help </a:t>
+            </a:r>
+            <a:r>
+              <a:rPr lang="en-GB" dirty="0"/>
               <a:t>–</a:t>
-            </a:r>
-            <a:r>
-              <a:rPr lang="en-GB">
-                <a:latin typeface="Consolas" panose="020B0609020204030204" pitchFamily="49" charset="0"/>
-              </a:rPr>
-              <a:t> </a:t>
             </a:r>
             <a:r>
               <a:rPr lang="en-GB" dirty="0">
                 <a:latin typeface="Consolas" panose="020B0609020204030204" pitchFamily="49" charset="0"/>
               </a:rPr>
-              <a:t>for </a:t>
-            </a:r>
-            <a:r>
-              <a:rPr lang="en-GB">
-                <a:latin typeface="Consolas" panose="020B0609020204030204" pitchFamily="49" charset="0"/>
-              </a:rPr>
-              <a:t>command syntax</a:t>
-            </a:r>
-            <a:endParaRPr lang="en-GB" dirty="0">
-              <a:latin typeface="Consolas" panose="020B0609020204030204" pitchFamily="49" charset="0"/>
-            </a:endParaRPr>
+              <a:t> for command syntax</a:t>
+            </a:r>
           </a:p>
         </p:txBody>
       </p:sp>

</xml_diff>